<commit_message>
Added stack and queue presentation
</commit_message>
<xml_diff>
--- a/05_Stack_and_Queue/Nasko/04_Stack and queue.pptx
+++ b/05_Stack_and_Queue/Nasko/04_Stack and queue.pptx
@@ -9,7 +9,8 @@
     <p:sldId id="257" r:id="rId3"/>
     <p:sldId id="258" r:id="rId4"/>
     <p:sldId id="260" r:id="rId5"/>
-    <p:sldId id="259" r:id="rId6"/>
+    <p:sldId id="261" r:id="rId6"/>
+    <p:sldId id="259" r:id="rId7"/>
   </p:sldIdLst>
   <p:sldSz cx="12192000" cy="6858000"/>
   <p:notesSz cx="6858000" cy="9144000"/>
@@ -108,6 +109,11 @@
       </a:defRPr>
     </a:lvl9pPr>
   </p:defaultTextStyle>
+  <p:extLst>
+    <p:ext uri="{EFAFB233-063F-42B5-8137-9DF3F51BA10A}">
+      <p15:sldGuideLst xmlns:p15="http://schemas.microsoft.com/office/powerpoint/2012/main"/>
+    </p:ext>
+  </p:extLst>
 </p:presentation>
 </file>
 
@@ -12719,6 +12725,112 @@
           <p:cNvPr id="2" name="Title 1">
             <a:extLst>
               <a:ext uri="{FF2B5EF4-FFF2-40B4-BE49-F238E27FC236}">
+                <a16:creationId xmlns:a16="http://schemas.microsoft.com/office/drawing/2014/main" id="{81FDC0DF-01E3-D649-B782-53DAB56FEEC8}"/>
+              </a:ext>
+            </a:extLst>
+          </p:cNvPr>
+          <p:cNvSpPr>
+            <a:spLocks noGrp="1"/>
+          </p:cNvSpPr>
+          <p:nvPr>
+            <p:ph type="title"/>
+          </p:nvPr>
+        </p:nvSpPr>
+        <p:spPr/>
+        <p:txBody>
+          <a:bodyPr/>
+          <a:lstStyle/>
+          <a:p>
+            <a:r>
+              <a:rPr lang="en-US"/>
+              <a:t>Exam 1 2021/2022</a:t>
+            </a:r>
+            <a:endParaRPr lang="bg-BG" dirty="0"/>
+          </a:p>
+        </p:txBody>
+      </p:sp>
+      <p:sp>
+        <p:nvSpPr>
+          <p:cNvPr id="3" name="Content Placeholder 2">
+            <a:extLst>
+              <a:ext uri="{FF2B5EF4-FFF2-40B4-BE49-F238E27FC236}">
+                <a16:creationId xmlns:a16="http://schemas.microsoft.com/office/drawing/2014/main" id="{4D5EC84E-A13B-ED3A-3FB0-389D27DB3EB2}"/>
+              </a:ext>
+            </a:extLst>
+          </p:cNvPr>
+          <p:cNvSpPr>
+            <a:spLocks noGrp="1"/>
+          </p:cNvSpPr>
+          <p:nvPr>
+            <p:ph idx="1"/>
+          </p:nvPr>
+        </p:nvSpPr>
+        <p:spPr/>
+        <p:txBody>
+          <a:bodyPr/>
+          <a:lstStyle/>
+          <a:p>
+            <a:r>
+              <a:rPr lang="en-US" dirty="0">
+                <a:hlinkClick r:id="rId2"/>
+              </a:rPr>
+              <a:t>https://github.com/NaskoVasilev/SDA_2022-2023/tree/main/Exams/01_Exam</a:t>
+            </a:r>
+            <a:r>
+              <a:rPr lang="en-US" dirty="0"/>
+              <a:t> </a:t>
+            </a:r>
+          </a:p>
+          <a:p>
+            <a:r>
+              <a:rPr lang="pt-BR" dirty="0">
+                <a:hlinkClick r:id="rId3"/>
+              </a:rPr>
+              <a:t>https://www.hackerrank.com/contests/sda-2021-2021-test-1/challenges</a:t>
+            </a:r>
+            <a:r>
+              <a:rPr lang="en-US" dirty="0"/>
+              <a:t> </a:t>
+            </a:r>
+            <a:endParaRPr lang="bg-BG" dirty="0"/>
+          </a:p>
+        </p:txBody>
+      </p:sp>
+    </p:spTree>
+    <p:extLst>
+      <p:ext uri="{BB962C8B-B14F-4D97-AF65-F5344CB8AC3E}">
+        <p14:creationId xmlns:p14="http://schemas.microsoft.com/office/powerpoint/2010/main" val="3382902064"/>
+      </p:ext>
+    </p:extLst>
+  </p:cSld>
+  <p:clrMapOvr>
+    <a:masterClrMapping/>
+  </p:clrMapOvr>
+</p:sld>
+</file>
+
+<file path=ppt/slides/slide6.xml><?xml version="1.0" encoding="utf-8"?>
+<p:sld xmlns:a="http://schemas.openxmlformats.org/drawingml/2006/main" xmlns:r="http://schemas.openxmlformats.org/officeDocument/2006/relationships" xmlns:p="http://schemas.openxmlformats.org/presentationml/2006/main">
+  <p:cSld>
+    <p:spTree>
+      <p:nvGrpSpPr>
+        <p:cNvPr id="1" name=""/>
+        <p:cNvGrpSpPr/>
+        <p:nvPr/>
+      </p:nvGrpSpPr>
+      <p:grpSpPr>
+        <a:xfrm>
+          <a:off x="0" y="0"/>
+          <a:ext cx="0" cy="0"/>
+          <a:chOff x="0" y="0"/>
+          <a:chExt cx="0" cy="0"/>
+        </a:xfrm>
+      </p:grpSpPr>
+      <p:sp>
+        <p:nvSpPr>
+          <p:cNvPr id="2" name="Title 1">
+            <a:extLst>
+              <a:ext uri="{FF2B5EF4-FFF2-40B4-BE49-F238E27FC236}">
                 <a16:creationId xmlns:a16="http://schemas.microsoft.com/office/drawing/2014/main" id="{33F85C42-C310-6C79-A539-7B6A58EC4E81}"/>
               </a:ext>
             </a:extLst>

</xml_diff>

<commit_message>
Added basic trees resources
</commit_message>
<xml_diff>
--- a/05_Stack_and_Queue/Nasko/04_Stack and queue.pptx
+++ b/05_Stack_and_Queue/Nasko/04_Stack and queue.pptx
@@ -167,7 +167,7 @@
           <a:noFill/>
           <a:extLst>
             <a:ext uri="{909E8E84-426E-40dd-AFC4-6F175D3DCCD1}">
-              <a14:hiddenFill xmlns:a14="http://schemas.microsoft.com/office/drawing/2010/main" xmlns="">
+              <a14:hiddenFill xmlns="" xmlns:a14="http://schemas.microsoft.com/office/drawing/2010/main">
                 <a:solidFill>
                   <a:srgbClr val="FFFFFF"/>
                 </a:solidFill>
@@ -227,7 +227,7 @@
             </a:ln>
             <a:extLst>
               <a:ext uri="{91240B29-F687-4f45-9708-019B960494DF}">
-                <a14:hiddenLine xmlns:a14="http://schemas.microsoft.com/office/drawing/2010/main" xmlns="" w="9525">
+                <a14:hiddenLine xmlns="" xmlns:a14="http://schemas.microsoft.com/office/drawing/2010/main" w="9525">
                   <a:solidFill>
                     <a:srgbClr val="000000"/>
                   </a:solidFill>
@@ -317,7 +317,7 @@
             </a:ln>
             <a:extLst>
               <a:ext uri="{91240B29-F687-4f45-9708-019B960494DF}">
-                <a14:hiddenLine xmlns:a14="http://schemas.microsoft.com/office/drawing/2010/main" xmlns="" w="9525">
+                <a14:hiddenLine xmlns="" xmlns:a14="http://schemas.microsoft.com/office/drawing/2010/main" w="9525">
                   <a:solidFill>
                     <a:srgbClr val="000000"/>
                   </a:solidFill>
@@ -407,7 +407,7 @@
             </a:ln>
             <a:extLst>
               <a:ext uri="{91240B29-F687-4f45-9708-019B960494DF}">
-                <a14:hiddenLine xmlns:a14="http://schemas.microsoft.com/office/drawing/2010/main" xmlns="" w="9525">
+                <a14:hiddenLine xmlns="" xmlns:a14="http://schemas.microsoft.com/office/drawing/2010/main" w="9525">
                   <a:solidFill>
                     <a:srgbClr val="000000"/>
                   </a:solidFill>
@@ -441,7 +441,7 @@
             </a:ln>
             <a:extLst>
               <a:ext uri="{91240B29-F687-4f45-9708-019B960494DF}">
-                <a14:hiddenLine xmlns:a14="http://schemas.microsoft.com/office/drawing/2010/main" xmlns="" w="9525">
+                <a14:hiddenLine xmlns="" xmlns:a14="http://schemas.microsoft.com/office/drawing/2010/main" w="9525">
                   <a:solidFill>
                     <a:srgbClr val="000000"/>
                   </a:solidFill>
@@ -531,7 +531,7 @@
             </a:ln>
             <a:extLst>
               <a:ext uri="{91240B29-F687-4f45-9708-019B960494DF}">
-                <a14:hiddenLine xmlns:a14="http://schemas.microsoft.com/office/drawing/2010/main" xmlns="" w="9525">
+                <a14:hiddenLine xmlns="" xmlns:a14="http://schemas.microsoft.com/office/drawing/2010/main" w="9525">
                   <a:solidFill>
                     <a:srgbClr val="000000"/>
                   </a:solidFill>
@@ -593,7 +593,7 @@
             </a:ln>
             <a:extLst>
               <a:ext uri="{91240B29-F687-4f45-9708-019B960494DF}">
-                <a14:hiddenLine xmlns:a14="http://schemas.microsoft.com/office/drawing/2010/main" xmlns="" w="9525">
+                <a14:hiddenLine xmlns="" xmlns:a14="http://schemas.microsoft.com/office/drawing/2010/main" w="9525">
                   <a:solidFill>
                     <a:srgbClr val="000000"/>
                   </a:solidFill>
@@ -655,7 +655,7 @@
             </a:ln>
             <a:extLst>
               <a:ext uri="{91240B29-F687-4f45-9708-019B960494DF}">
-                <a14:hiddenLine xmlns:a14="http://schemas.microsoft.com/office/drawing/2010/main" xmlns="" w="9525">
+                <a14:hiddenLine xmlns="" xmlns:a14="http://schemas.microsoft.com/office/drawing/2010/main" w="9525">
                   <a:solidFill>
                     <a:srgbClr val="000000"/>
                   </a:solidFill>
@@ -745,7 +745,7 @@
             </a:ln>
             <a:extLst>
               <a:ext uri="{91240B29-F687-4f45-9708-019B960494DF}">
-                <a14:hiddenLine xmlns:a14="http://schemas.microsoft.com/office/drawing/2010/main" xmlns="" w="9525">
+                <a14:hiddenLine xmlns="" xmlns:a14="http://schemas.microsoft.com/office/drawing/2010/main" w="9525">
                   <a:solidFill>
                     <a:srgbClr val="000000"/>
                   </a:solidFill>
@@ -807,7 +807,7 @@
             </a:ln>
             <a:extLst>
               <a:ext uri="{91240B29-F687-4f45-9708-019B960494DF}">
-                <a14:hiddenLine xmlns:a14="http://schemas.microsoft.com/office/drawing/2010/main" xmlns="" w="9525">
+                <a14:hiddenLine xmlns="" xmlns:a14="http://schemas.microsoft.com/office/drawing/2010/main" w="9525">
                   <a:solidFill>
                     <a:srgbClr val="000000"/>
                   </a:solidFill>
@@ -869,7 +869,7 @@
             </a:ln>
             <a:extLst>
               <a:ext uri="{91240B29-F687-4f45-9708-019B960494DF}">
-                <a14:hiddenLine xmlns:a14="http://schemas.microsoft.com/office/drawing/2010/main" xmlns="" w="9525">
+                <a14:hiddenLine xmlns="" xmlns:a14="http://schemas.microsoft.com/office/drawing/2010/main" w="9525">
                   <a:solidFill>
                     <a:srgbClr val="000000"/>
                   </a:solidFill>
@@ -959,7 +959,7 @@
             </a:ln>
             <a:extLst>
               <a:ext uri="{91240B29-F687-4f45-9708-019B960494DF}">
-                <a14:hiddenLine xmlns:a14="http://schemas.microsoft.com/office/drawing/2010/main" xmlns="" w="9525">
+                <a14:hiddenLine xmlns="" xmlns:a14="http://schemas.microsoft.com/office/drawing/2010/main" w="9525">
                   <a:solidFill>
                     <a:srgbClr val="000000"/>
                   </a:solidFill>
@@ -1049,7 +1049,7 @@
             </a:ln>
             <a:extLst>
               <a:ext uri="{91240B29-F687-4f45-9708-019B960494DF}">
-                <a14:hiddenLine xmlns:a14="http://schemas.microsoft.com/office/drawing/2010/main" xmlns="" w="9525">
+                <a14:hiddenLine xmlns="" xmlns:a14="http://schemas.microsoft.com/office/drawing/2010/main" w="9525">
                   <a:solidFill>
                     <a:srgbClr val="000000"/>
                   </a:solidFill>
@@ -1111,7 +1111,7 @@
             </a:ln>
             <a:extLst>
               <a:ext uri="{91240B29-F687-4f45-9708-019B960494DF}">
-                <a14:hiddenLine xmlns:a14="http://schemas.microsoft.com/office/drawing/2010/main" xmlns="" w="9525">
+                <a14:hiddenLine xmlns="" xmlns:a14="http://schemas.microsoft.com/office/drawing/2010/main" w="9525">
                   <a:solidFill>
                     <a:srgbClr val="000000"/>
                   </a:solidFill>
@@ -1221,7 +1221,7 @@
             </a:ln>
             <a:extLst>
               <a:ext uri="{91240B29-F687-4f45-9708-019B960494DF}">
-                <a14:hiddenLine xmlns:a14="http://schemas.microsoft.com/office/drawing/2010/main" xmlns="" w="9525">
+                <a14:hiddenLine xmlns="" xmlns:a14="http://schemas.microsoft.com/office/drawing/2010/main" w="9525">
                   <a:solidFill>
                     <a:srgbClr val="000000"/>
                   </a:solidFill>
@@ -1283,7 +1283,7 @@
             </a:ln>
             <a:extLst>
               <a:ext uri="{91240B29-F687-4f45-9708-019B960494DF}">
-                <a14:hiddenLine xmlns:a14="http://schemas.microsoft.com/office/drawing/2010/main" xmlns="" w="9525">
+                <a14:hiddenLine xmlns="" xmlns:a14="http://schemas.microsoft.com/office/drawing/2010/main" w="9525">
                   <a:solidFill>
                     <a:srgbClr val="000000"/>
                   </a:solidFill>
@@ -1373,7 +1373,7 @@
             </a:ln>
             <a:extLst>
               <a:ext uri="{91240B29-F687-4f45-9708-019B960494DF}">
-                <a14:hiddenLine xmlns:a14="http://schemas.microsoft.com/office/drawing/2010/main" xmlns="" w="9525">
+                <a14:hiddenLine xmlns="" xmlns:a14="http://schemas.microsoft.com/office/drawing/2010/main" w="9525">
                   <a:solidFill>
                     <a:srgbClr val="000000"/>
                   </a:solidFill>
@@ -1463,7 +1463,7 @@
             </a:ln>
             <a:extLst>
               <a:ext uri="{91240B29-F687-4f45-9708-019B960494DF}">
-                <a14:hiddenLine xmlns:a14="http://schemas.microsoft.com/office/drawing/2010/main" xmlns="" w="9525">
+                <a14:hiddenLine xmlns="" xmlns:a14="http://schemas.microsoft.com/office/drawing/2010/main" w="9525">
                   <a:solidFill>
                     <a:srgbClr val="000000"/>
                   </a:solidFill>
@@ -1525,7 +1525,7 @@
             </a:ln>
             <a:extLst>
               <a:ext uri="{91240B29-F687-4f45-9708-019B960494DF}">
-                <a14:hiddenLine xmlns:a14="http://schemas.microsoft.com/office/drawing/2010/main" xmlns="" w="9525">
+                <a14:hiddenLine xmlns="" xmlns:a14="http://schemas.microsoft.com/office/drawing/2010/main" w="9525">
                   <a:solidFill>
                     <a:srgbClr val="000000"/>
                   </a:solidFill>
@@ -1615,7 +1615,7 @@
             </a:ln>
             <a:extLst>
               <a:ext uri="{91240B29-F687-4f45-9708-019B960494DF}">
-                <a14:hiddenLine xmlns:a14="http://schemas.microsoft.com/office/drawing/2010/main" xmlns="" w="9525">
+                <a14:hiddenLine xmlns="" xmlns:a14="http://schemas.microsoft.com/office/drawing/2010/main" w="9525">
                   <a:solidFill>
                     <a:srgbClr val="000000"/>
                   </a:solidFill>
@@ -1705,7 +1705,7 @@
             </a:ln>
             <a:extLst>
               <a:ext uri="{91240B29-F687-4f45-9708-019B960494DF}">
-                <a14:hiddenLine xmlns:a14="http://schemas.microsoft.com/office/drawing/2010/main" xmlns="" w="9525">
+                <a14:hiddenLine xmlns="" xmlns:a14="http://schemas.microsoft.com/office/drawing/2010/main" w="9525">
                   <a:solidFill>
                     <a:srgbClr val="000000"/>
                   </a:solidFill>
@@ -1761,7 +1761,7 @@
             </a:ln>
             <a:extLst>
               <a:ext uri="{91240B29-F687-4f45-9708-019B960494DF}">
-                <a14:hiddenLine xmlns:a14="http://schemas.microsoft.com/office/drawing/2010/main" xmlns="" w="9525">
+                <a14:hiddenLine xmlns="" xmlns:a14="http://schemas.microsoft.com/office/drawing/2010/main" w="9525">
                   <a:solidFill>
                     <a:srgbClr val="000000"/>
                   </a:solidFill>
@@ -1851,7 +1851,7 @@
             </a:ln>
             <a:extLst>
               <a:ext uri="{91240B29-F687-4f45-9708-019B960494DF}">
-                <a14:hiddenLine xmlns:a14="http://schemas.microsoft.com/office/drawing/2010/main" xmlns="" w="9525">
+                <a14:hiddenLine xmlns="" xmlns:a14="http://schemas.microsoft.com/office/drawing/2010/main" w="9525">
                   <a:solidFill>
                     <a:srgbClr val="000000"/>
                   </a:solidFill>
@@ -1907,7 +1907,7 @@
             </a:ln>
             <a:extLst>
               <a:ext uri="{91240B29-F687-4f45-9708-019B960494DF}">
-                <a14:hiddenLine xmlns:a14="http://schemas.microsoft.com/office/drawing/2010/main" xmlns="" w="9525">
+                <a14:hiddenLine xmlns="" xmlns:a14="http://schemas.microsoft.com/office/drawing/2010/main" w="9525">
                   <a:solidFill>
                     <a:srgbClr val="000000"/>
                   </a:solidFill>
@@ -1997,7 +1997,7 @@
             </a:ln>
             <a:extLst>
               <a:ext uri="{91240B29-F687-4f45-9708-019B960494DF}">
-                <a14:hiddenLine xmlns:a14="http://schemas.microsoft.com/office/drawing/2010/main" xmlns="" w="9525">
+                <a14:hiddenLine xmlns="" xmlns:a14="http://schemas.microsoft.com/office/drawing/2010/main" w="9525">
                   <a:solidFill>
                     <a:srgbClr val="000000"/>
                   </a:solidFill>
@@ -2065,7 +2065,7 @@
             </a:ln>
             <a:extLst>
               <a:ext uri="{91240B29-F687-4f45-9708-019B960494DF}">
-                <a14:hiddenLine xmlns:a14="http://schemas.microsoft.com/office/drawing/2010/main" xmlns="" w="9525">
+                <a14:hiddenLine xmlns="" xmlns:a14="http://schemas.microsoft.com/office/drawing/2010/main" w="9525">
                   <a:solidFill>
                     <a:srgbClr val="000000"/>
                   </a:solidFill>
@@ -2155,7 +2155,7 @@
             </a:ln>
             <a:extLst>
               <a:ext uri="{91240B29-F687-4f45-9708-019B960494DF}">
-                <a14:hiddenLine xmlns:a14="http://schemas.microsoft.com/office/drawing/2010/main" xmlns="" w="9525">
+                <a14:hiddenLine xmlns="" xmlns:a14="http://schemas.microsoft.com/office/drawing/2010/main" w="9525">
                   <a:solidFill>
                     <a:srgbClr val="000000"/>
                   </a:solidFill>
@@ -2223,7 +2223,7 @@
             </a:ln>
             <a:extLst>
               <a:ext uri="{91240B29-F687-4f45-9708-019B960494DF}">
-                <a14:hiddenLine xmlns:a14="http://schemas.microsoft.com/office/drawing/2010/main" xmlns="" w="9525">
+                <a14:hiddenLine xmlns="" xmlns:a14="http://schemas.microsoft.com/office/drawing/2010/main" w="9525">
                   <a:solidFill>
                     <a:srgbClr val="000000"/>
                   </a:solidFill>
@@ -2313,7 +2313,7 @@
             </a:ln>
             <a:extLst>
               <a:ext uri="{91240B29-F687-4f45-9708-019B960494DF}">
-                <a14:hiddenLine xmlns:a14="http://schemas.microsoft.com/office/drawing/2010/main" xmlns="" w="9525">
+                <a14:hiddenLine xmlns="" xmlns:a14="http://schemas.microsoft.com/office/drawing/2010/main" w="9525">
                   <a:solidFill>
                     <a:srgbClr val="000000"/>
                   </a:solidFill>
@@ -2347,7 +2347,7 @@
             </a:ln>
             <a:extLst>
               <a:ext uri="{91240B29-F687-4f45-9708-019B960494DF}">
-                <a14:hiddenLine xmlns:a14="http://schemas.microsoft.com/office/drawing/2010/main" xmlns="" w="9525">
+                <a14:hiddenLine xmlns="" xmlns:a14="http://schemas.microsoft.com/office/drawing/2010/main" w="9525">
                   <a:solidFill>
                     <a:srgbClr val="000000"/>
                   </a:solidFill>
@@ -2437,7 +2437,7 @@
             </a:ln>
             <a:extLst>
               <a:ext uri="{91240B29-F687-4f45-9708-019B960494DF}">
-                <a14:hiddenLine xmlns:a14="http://schemas.microsoft.com/office/drawing/2010/main" xmlns="" w="9525">
+                <a14:hiddenLine xmlns="" xmlns:a14="http://schemas.microsoft.com/office/drawing/2010/main" w="9525">
                   <a:solidFill>
                     <a:srgbClr val="000000"/>
                   </a:solidFill>
@@ -2499,7 +2499,7 @@
             </a:ln>
             <a:extLst>
               <a:ext uri="{91240B29-F687-4f45-9708-019B960494DF}">
-                <a14:hiddenLine xmlns:a14="http://schemas.microsoft.com/office/drawing/2010/main" xmlns="" w="9525">
+                <a14:hiddenLine xmlns="" xmlns:a14="http://schemas.microsoft.com/office/drawing/2010/main" w="9525">
                   <a:solidFill>
                     <a:srgbClr val="000000"/>
                   </a:solidFill>
@@ -2561,7 +2561,7 @@
             </a:ln>
             <a:extLst>
               <a:ext uri="{91240B29-F687-4f45-9708-019B960494DF}">
-                <a14:hiddenLine xmlns:a14="http://schemas.microsoft.com/office/drawing/2010/main" xmlns="" w="9525">
+                <a14:hiddenLine xmlns="" xmlns:a14="http://schemas.microsoft.com/office/drawing/2010/main" w="9525">
                   <a:solidFill>
                     <a:srgbClr val="000000"/>
                   </a:solidFill>
@@ -2651,7 +2651,7 @@
             </a:ln>
             <a:extLst>
               <a:ext uri="{91240B29-F687-4f45-9708-019B960494DF}">
-                <a14:hiddenLine xmlns:a14="http://schemas.microsoft.com/office/drawing/2010/main" xmlns="" w="9525">
+                <a14:hiddenLine xmlns="" xmlns:a14="http://schemas.microsoft.com/office/drawing/2010/main" w="9525">
                   <a:solidFill>
                     <a:srgbClr val="000000"/>
                   </a:solidFill>
@@ -2719,7 +2719,7 @@
             </a:ln>
             <a:extLst>
               <a:ext uri="{91240B29-F687-4f45-9708-019B960494DF}">
-                <a14:hiddenLine xmlns:a14="http://schemas.microsoft.com/office/drawing/2010/main" xmlns="" w="9525">
+                <a14:hiddenLine xmlns="" xmlns:a14="http://schemas.microsoft.com/office/drawing/2010/main" w="9525">
                   <a:solidFill>
                     <a:srgbClr val="000000"/>
                   </a:solidFill>
@@ -2781,7 +2781,7 @@
             </a:ln>
             <a:extLst>
               <a:ext uri="{91240B29-F687-4f45-9708-019B960494DF}">
-                <a14:hiddenLine xmlns:a14="http://schemas.microsoft.com/office/drawing/2010/main" xmlns="" w="9525">
+                <a14:hiddenLine xmlns="" xmlns:a14="http://schemas.microsoft.com/office/drawing/2010/main" w="9525">
                   <a:solidFill>
                     <a:srgbClr val="000000"/>
                   </a:solidFill>
@@ -2871,7 +2871,7 @@
             </a:ln>
             <a:extLst>
               <a:ext uri="{91240B29-F687-4f45-9708-019B960494DF}">
-                <a14:hiddenLine xmlns:a14="http://schemas.microsoft.com/office/drawing/2010/main" xmlns="" w="9525">
+                <a14:hiddenLine xmlns="" xmlns:a14="http://schemas.microsoft.com/office/drawing/2010/main" w="9525">
                   <a:solidFill>
                     <a:srgbClr val="000000"/>
                   </a:solidFill>
@@ -2933,7 +2933,7 @@
             </a:ln>
             <a:extLst>
               <a:ext uri="{91240B29-F687-4f45-9708-019B960494DF}">
-                <a14:hiddenLine xmlns:a14="http://schemas.microsoft.com/office/drawing/2010/main" xmlns="" w="9525">
+                <a14:hiddenLine xmlns="" xmlns:a14="http://schemas.microsoft.com/office/drawing/2010/main" w="9525">
                   <a:solidFill>
                     <a:srgbClr val="000000"/>
                   </a:solidFill>
@@ -3023,7 +3023,7 @@
             </a:ln>
             <a:extLst>
               <a:ext uri="{91240B29-F687-4f45-9708-019B960494DF}">
-                <a14:hiddenLine xmlns:a14="http://schemas.microsoft.com/office/drawing/2010/main" xmlns="" w="9525">
+                <a14:hiddenLine xmlns="" xmlns:a14="http://schemas.microsoft.com/office/drawing/2010/main" w="9525">
                   <a:solidFill>
                     <a:srgbClr val="000000"/>
                   </a:solidFill>
@@ -3085,7 +3085,7 @@
             </a:ln>
             <a:extLst>
               <a:ext uri="{91240B29-F687-4f45-9708-019B960494DF}">
-                <a14:hiddenLine xmlns:a14="http://schemas.microsoft.com/office/drawing/2010/main" xmlns="" w="9525">
+                <a14:hiddenLine xmlns="" xmlns:a14="http://schemas.microsoft.com/office/drawing/2010/main" w="9525">
                   <a:solidFill>
                     <a:srgbClr val="000000"/>
                   </a:solidFill>
@@ -3175,7 +3175,7 @@
             </a:ln>
             <a:extLst>
               <a:ext uri="{91240B29-F687-4f45-9708-019B960494DF}">
-                <a14:hiddenLine xmlns:a14="http://schemas.microsoft.com/office/drawing/2010/main" xmlns="" w="9525">
+                <a14:hiddenLine xmlns="" xmlns:a14="http://schemas.microsoft.com/office/drawing/2010/main" w="9525">
                   <a:solidFill>
                     <a:srgbClr val="000000"/>
                   </a:solidFill>
@@ -3209,7 +3209,7 @@
             </a:ln>
             <a:extLst>
               <a:ext uri="{91240B29-F687-4f45-9708-019B960494DF}">
-                <a14:hiddenLine xmlns:a14="http://schemas.microsoft.com/office/drawing/2010/main" xmlns="" w="9525">
+                <a14:hiddenLine xmlns="" xmlns:a14="http://schemas.microsoft.com/office/drawing/2010/main" w="9525">
                   <a:solidFill>
                     <a:srgbClr val="000000"/>
                   </a:solidFill>
@@ -3274,7 +3274,7 @@
             </a:ln>
             <a:extLst>
               <a:ext uri="{91240B29-F687-4f45-9708-019B960494DF}">
-                <a14:hiddenLine xmlns:a14="http://schemas.microsoft.com/office/drawing/2010/main" xmlns="" w="9525">
+                <a14:hiddenLine xmlns="" xmlns:a14="http://schemas.microsoft.com/office/drawing/2010/main" w="9525">
                   <a:solidFill>
                     <a:srgbClr val="000000"/>
                   </a:solidFill>
@@ -3364,7 +3364,7 @@
             </a:ln>
             <a:extLst>
               <a:ext uri="{91240B29-F687-4f45-9708-019B960494DF}">
-                <a14:hiddenLine xmlns:a14="http://schemas.microsoft.com/office/drawing/2010/main" xmlns="" w="9525">
+                <a14:hiddenLine xmlns="" xmlns:a14="http://schemas.microsoft.com/office/drawing/2010/main" w="9525">
                   <a:solidFill>
                     <a:srgbClr val="000000"/>
                   </a:solidFill>
@@ -3426,7 +3426,7 @@
             </a:ln>
             <a:extLst>
               <a:ext uri="{91240B29-F687-4f45-9708-019B960494DF}">
-                <a14:hiddenLine xmlns:a14="http://schemas.microsoft.com/office/drawing/2010/main" xmlns="" w="9525">
+                <a14:hiddenLine xmlns="" xmlns:a14="http://schemas.microsoft.com/office/drawing/2010/main" w="9525">
                   <a:solidFill>
                     <a:srgbClr val="000000"/>
                   </a:solidFill>
@@ -3516,7 +3516,7 @@
             </a:ln>
             <a:extLst>
               <a:ext uri="{91240B29-F687-4f45-9708-019B960494DF}">
-                <a14:hiddenLine xmlns:a14="http://schemas.microsoft.com/office/drawing/2010/main" xmlns="" w="9525">
+                <a14:hiddenLine xmlns="" xmlns:a14="http://schemas.microsoft.com/office/drawing/2010/main" w="9525">
                   <a:solidFill>
                     <a:srgbClr val="000000"/>
                   </a:solidFill>
@@ -3606,7 +3606,7 @@
             </a:ln>
             <a:extLst>
               <a:ext uri="{91240B29-F687-4f45-9708-019B960494DF}">
-                <a14:hiddenLine xmlns:a14="http://schemas.microsoft.com/office/drawing/2010/main" xmlns="" w="9525">
+                <a14:hiddenLine xmlns="" xmlns:a14="http://schemas.microsoft.com/office/drawing/2010/main" w="9525">
                   <a:solidFill>
                     <a:srgbClr val="000000"/>
                   </a:solidFill>
@@ -3671,7 +3671,7 @@
             </a:ln>
             <a:extLst>
               <a:ext uri="{91240B29-F687-4f45-9708-019B960494DF}">
-                <a14:hiddenLine xmlns:a14="http://schemas.microsoft.com/office/drawing/2010/main" xmlns="" w="9525">
+                <a14:hiddenLine xmlns="" xmlns:a14="http://schemas.microsoft.com/office/drawing/2010/main" w="9525">
                   <a:solidFill>
                     <a:srgbClr val="000000"/>
                   </a:solidFill>
@@ -3733,7 +3733,7 @@
             </a:ln>
             <a:extLst>
               <a:ext uri="{91240B29-F687-4f45-9708-019B960494DF}">
-                <a14:hiddenLine xmlns:a14="http://schemas.microsoft.com/office/drawing/2010/main" xmlns="" w="9525">
+                <a14:hiddenLine xmlns="" xmlns:a14="http://schemas.microsoft.com/office/drawing/2010/main" w="9525">
                   <a:solidFill>
                     <a:srgbClr val="000000"/>
                   </a:solidFill>
@@ -3823,7 +3823,7 @@
             </a:ln>
             <a:extLst>
               <a:ext uri="{91240B29-F687-4f45-9708-019B960494DF}">
-                <a14:hiddenLine xmlns:a14="http://schemas.microsoft.com/office/drawing/2010/main" xmlns="" w="9525">
+                <a14:hiddenLine xmlns="" xmlns:a14="http://schemas.microsoft.com/office/drawing/2010/main" w="9525">
                   <a:solidFill>
                     <a:srgbClr val="000000"/>
                   </a:solidFill>
@@ -3913,7 +3913,7 @@
             </a:ln>
             <a:extLst>
               <a:ext uri="{91240B29-F687-4f45-9708-019B960494DF}">
-                <a14:hiddenLine xmlns:a14="http://schemas.microsoft.com/office/drawing/2010/main" xmlns="" w="9525">
+                <a14:hiddenLine xmlns="" xmlns:a14="http://schemas.microsoft.com/office/drawing/2010/main" w="9525">
                   <a:solidFill>
                     <a:srgbClr val="000000"/>
                   </a:solidFill>
@@ -3975,7 +3975,7 @@
             </a:ln>
             <a:extLst>
               <a:ext uri="{91240B29-F687-4f45-9708-019B960494DF}">
-                <a14:hiddenLine xmlns:a14="http://schemas.microsoft.com/office/drawing/2010/main" xmlns="" w="9525">
+                <a14:hiddenLine xmlns="" xmlns:a14="http://schemas.microsoft.com/office/drawing/2010/main" w="9525">
                   <a:solidFill>
                     <a:srgbClr val="000000"/>
                   </a:solidFill>
@@ -4095,7 +4095,7 @@
             </a:ln>
             <a:extLst>
               <a:ext uri="{91240B29-F687-4f45-9708-019B960494DF}">
-                <a14:hiddenLine xmlns:a14="http://schemas.microsoft.com/office/drawing/2010/main" xmlns="" w="9525">
+                <a14:hiddenLine xmlns="" xmlns:a14="http://schemas.microsoft.com/office/drawing/2010/main" w="9525">
                   <a:solidFill>
                     <a:srgbClr val="000000"/>
                   </a:solidFill>
@@ -4163,7 +4163,7 @@
             </a:ln>
             <a:extLst>
               <a:ext uri="{91240B29-F687-4f45-9708-019B960494DF}">
-                <a14:hiddenLine xmlns:a14="http://schemas.microsoft.com/office/drawing/2010/main" xmlns="" w="9525">
+                <a14:hiddenLine xmlns="" xmlns:a14="http://schemas.microsoft.com/office/drawing/2010/main" w="9525">
                   <a:solidFill>
                     <a:srgbClr val="000000"/>
                   </a:solidFill>
@@ -4253,7 +4253,7 @@
             </a:ln>
             <a:extLst>
               <a:ext uri="{91240B29-F687-4f45-9708-019B960494DF}">
-                <a14:hiddenLine xmlns:a14="http://schemas.microsoft.com/office/drawing/2010/main" xmlns="" w="9525">
+                <a14:hiddenLine xmlns="" xmlns:a14="http://schemas.microsoft.com/office/drawing/2010/main" w="9525">
                   <a:solidFill>
                     <a:srgbClr val="000000"/>
                   </a:solidFill>
@@ -4393,7 +4393,7 @@
           <a:p>
             <a:fld id="{48A87A34-81AB-432B-8DAE-1953F412C126}" type="datetimeFigureOut">
               <a:rPr lang="en-US" dirty="0"/>
-              <a:t>11/2/2022</a:t>
+              <a:t>11/10/2022</a:t>
             </a:fld>
             <a:endParaRPr lang="en-US" dirty="0"/>
           </a:p>
@@ -4655,7 +4655,7 @@
           <a:p>
             <a:fld id="{48A87A34-81AB-432B-8DAE-1953F412C126}" type="datetimeFigureOut">
               <a:rPr lang="en-US" dirty="0"/>
-              <a:t>11/2/2022</a:t>
+              <a:t>11/10/2022</a:t>
             </a:fld>
             <a:endParaRPr lang="en-US" dirty="0"/>
           </a:p>
@@ -4846,7 +4846,7 @@
           <a:p>
             <a:fld id="{48A87A34-81AB-432B-8DAE-1953F412C126}" type="datetimeFigureOut">
               <a:rPr lang="en-US" dirty="0"/>
-              <a:t>11/2/2022</a:t>
+              <a:t>11/10/2022</a:t>
             </a:fld>
             <a:endParaRPr lang="en-US" dirty="0"/>
           </a:p>
@@ -5104,7 +5104,7 @@
           <a:p>
             <a:fld id="{48A87A34-81AB-432B-8DAE-1953F412C126}" type="datetimeFigureOut">
               <a:rPr lang="en-US" dirty="0"/>
-              <a:t>11/2/2022</a:t>
+              <a:t>11/10/2022</a:t>
             </a:fld>
             <a:endParaRPr lang="en-US" dirty="0"/>
           </a:p>
@@ -5533,7 +5533,7 @@
           <a:p>
             <a:fld id="{48A87A34-81AB-432B-8DAE-1953F412C126}" type="datetimeFigureOut">
               <a:rPr lang="en-US" dirty="0"/>
-              <a:t>11/2/2022</a:t>
+              <a:t>11/10/2022</a:t>
             </a:fld>
             <a:endParaRPr lang="en-US" dirty="0"/>
           </a:p>
@@ -6074,7 +6074,7 @@
           <a:p>
             <a:fld id="{48A87A34-81AB-432B-8DAE-1953F412C126}" type="datetimeFigureOut">
               <a:rPr lang="en-US" dirty="0"/>
-              <a:t>11/2/2022</a:t>
+              <a:t>11/10/2022</a:t>
             </a:fld>
             <a:endParaRPr lang="en-US" dirty="0"/>
           </a:p>
@@ -6789,7 +6789,7 @@
           <a:p>
             <a:fld id="{48A87A34-81AB-432B-8DAE-1953F412C126}" type="datetimeFigureOut">
               <a:rPr lang="en-US" dirty="0"/>
-              <a:t>11/2/2022</a:t>
+              <a:t>11/10/2022</a:t>
             </a:fld>
             <a:endParaRPr lang="en-US" dirty="0"/>
           </a:p>
@@ -6954,7 +6954,7 @@
           <a:p>
             <a:fld id="{48A87A34-81AB-432B-8DAE-1953F412C126}" type="datetimeFigureOut">
               <a:rPr lang="en-US" dirty="0"/>
-              <a:t>11/2/2022</a:t>
+              <a:t>11/10/2022</a:t>
             </a:fld>
             <a:endParaRPr lang="en-US" dirty="0"/>
           </a:p>
@@ -7129,7 +7129,7 @@
           <a:p>
             <a:fld id="{48A87A34-81AB-432B-8DAE-1953F412C126}" type="datetimeFigureOut">
               <a:rPr lang="en-US" dirty="0"/>
-              <a:t>11/2/2022</a:t>
+              <a:t>11/10/2022</a:t>
             </a:fld>
             <a:endParaRPr lang="en-US" dirty="0"/>
           </a:p>
@@ -7294,7 +7294,7 @@
           <a:p>
             <a:fld id="{48A87A34-81AB-432B-8DAE-1953F412C126}" type="datetimeFigureOut">
               <a:rPr lang="en-US" dirty="0"/>
-              <a:t>11/2/2022</a:t>
+              <a:t>11/10/2022</a:t>
             </a:fld>
             <a:endParaRPr lang="en-US" dirty="0"/>
           </a:p>
@@ -7539,7 +7539,7 @@
           <a:p>
             <a:fld id="{48A87A34-81AB-432B-8DAE-1953F412C126}" type="datetimeFigureOut">
               <a:rPr lang="en-US" dirty="0"/>
-              <a:t>11/2/2022</a:t>
+              <a:t>11/10/2022</a:t>
             </a:fld>
             <a:endParaRPr lang="en-US" dirty="0"/>
           </a:p>
@@ -7766,7 +7766,7 @@
           <a:p>
             <a:fld id="{48A87A34-81AB-432B-8DAE-1953F412C126}" type="datetimeFigureOut">
               <a:rPr lang="en-US" dirty="0"/>
-              <a:t>11/2/2022</a:t>
+              <a:t>11/10/2022</a:t>
             </a:fld>
             <a:endParaRPr lang="en-US" dirty="0"/>
           </a:p>
@@ -8142,7 +8142,7 @@
           <a:p>
             <a:fld id="{48A87A34-81AB-432B-8DAE-1953F412C126}" type="datetimeFigureOut">
               <a:rPr lang="en-US" dirty="0"/>
-              <a:t>11/2/2022</a:t>
+              <a:t>11/10/2022</a:t>
             </a:fld>
             <a:endParaRPr lang="en-US" dirty="0"/>
           </a:p>
@@ -8255,7 +8255,7 @@
           <a:p>
             <a:fld id="{48A87A34-81AB-432B-8DAE-1953F412C126}" type="datetimeFigureOut">
               <a:rPr lang="en-US" dirty="0"/>
-              <a:t>11/2/2022</a:t>
+              <a:t>11/10/2022</a:t>
             </a:fld>
             <a:endParaRPr lang="en-US" dirty="0"/>
           </a:p>
@@ -8345,7 +8345,7 @@
           <a:p>
             <a:fld id="{48A87A34-81AB-432B-8DAE-1953F412C126}" type="datetimeFigureOut">
               <a:rPr lang="en-US" dirty="0"/>
-              <a:t>11/2/2022</a:t>
+              <a:t>11/10/2022</a:t>
             </a:fld>
             <a:endParaRPr lang="en-US" dirty="0"/>
           </a:p>
@@ -8589,7 +8589,7 @@
           <a:p>
             <a:fld id="{48A87A34-81AB-432B-8DAE-1953F412C126}" type="datetimeFigureOut">
               <a:rPr lang="en-US" dirty="0"/>
-              <a:t>11/2/2022</a:t>
+              <a:t>11/10/2022</a:t>
             </a:fld>
             <a:endParaRPr lang="en-US" dirty="0"/>
           </a:p>
@@ -8864,7 +8864,7 @@
           <a:p>
             <a:fld id="{48A87A34-81AB-432B-8DAE-1953F412C126}" type="datetimeFigureOut">
               <a:rPr lang="en-US" dirty="0"/>
-              <a:t>11/2/2022</a:t>
+              <a:t>11/10/2022</a:t>
             </a:fld>
             <a:endParaRPr lang="en-US" dirty="0"/>
           </a:p>
@@ -8975,7 +8975,7 @@
           <a:noFill/>
           <a:extLst>
             <a:ext uri="{909E8E84-426E-40dd-AFC4-6F175D3DCCD1}">
-              <a14:hiddenFill xmlns:a14="http://schemas.microsoft.com/office/drawing/2010/main" xmlns="">
+              <a14:hiddenFill xmlns="" xmlns:a14="http://schemas.microsoft.com/office/drawing/2010/main">
                 <a:solidFill>
                   <a:srgbClr val="FFFFFF"/>
                 </a:solidFill>
@@ -9049,7 +9049,7 @@
               </a:ln>
               <a:extLst>
                 <a:ext uri="{91240B29-F687-4f45-9708-019B960494DF}">
-                  <a14:hiddenLine xmlns:a14="http://schemas.microsoft.com/office/drawing/2010/main" xmlns="" w="9525">
+                  <a14:hiddenLine xmlns="" xmlns:a14="http://schemas.microsoft.com/office/drawing/2010/main" w="9525">
                     <a:solidFill>
                       <a:srgbClr val="000000"/>
                     </a:solidFill>
@@ -9139,7 +9139,7 @@
               </a:ln>
               <a:extLst>
                 <a:ext uri="{91240B29-F687-4f45-9708-019B960494DF}">
-                  <a14:hiddenLine xmlns:a14="http://schemas.microsoft.com/office/drawing/2010/main" xmlns="" w="9525">
+                  <a14:hiddenLine xmlns="" xmlns:a14="http://schemas.microsoft.com/office/drawing/2010/main" w="9525">
                     <a:solidFill>
                       <a:srgbClr val="000000"/>
                     </a:solidFill>
@@ -9229,7 +9229,7 @@
               </a:ln>
               <a:extLst>
                 <a:ext uri="{91240B29-F687-4f45-9708-019B960494DF}">
-                  <a14:hiddenLine xmlns:a14="http://schemas.microsoft.com/office/drawing/2010/main" xmlns="" w="9525">
+                  <a14:hiddenLine xmlns="" xmlns:a14="http://schemas.microsoft.com/office/drawing/2010/main" w="9525">
                     <a:solidFill>
                       <a:srgbClr val="000000"/>
                     </a:solidFill>
@@ -9291,7 +9291,7 @@
               </a:ln>
               <a:extLst>
                 <a:ext uri="{91240B29-F687-4f45-9708-019B960494DF}">
-                  <a14:hiddenLine xmlns:a14="http://schemas.microsoft.com/office/drawing/2010/main" xmlns="" w="9525">
+                  <a14:hiddenLine xmlns="" xmlns:a14="http://schemas.microsoft.com/office/drawing/2010/main" w="9525">
                     <a:solidFill>
                       <a:srgbClr val="000000"/>
                     </a:solidFill>
@@ -9381,7 +9381,7 @@
               </a:ln>
               <a:extLst>
                 <a:ext uri="{91240B29-F687-4f45-9708-019B960494DF}">
-                  <a14:hiddenLine xmlns:a14="http://schemas.microsoft.com/office/drawing/2010/main" xmlns="" w="9525">
+                  <a14:hiddenLine xmlns="" xmlns:a14="http://schemas.microsoft.com/office/drawing/2010/main" w="9525">
                     <a:solidFill>
                       <a:srgbClr val="000000"/>
                     </a:solidFill>
@@ -9443,7 +9443,7 @@
               </a:ln>
               <a:extLst>
                 <a:ext uri="{91240B29-F687-4f45-9708-019B960494DF}">
-                  <a14:hiddenLine xmlns:a14="http://schemas.microsoft.com/office/drawing/2010/main" xmlns="" w="9525">
+                  <a14:hiddenLine xmlns="" xmlns:a14="http://schemas.microsoft.com/office/drawing/2010/main" w="9525">
                     <a:solidFill>
                       <a:srgbClr val="000000"/>
                     </a:solidFill>
@@ -9505,7 +9505,7 @@
               </a:ln>
               <a:extLst>
                 <a:ext uri="{91240B29-F687-4f45-9708-019B960494DF}">
-                  <a14:hiddenLine xmlns:a14="http://schemas.microsoft.com/office/drawing/2010/main" xmlns="" w="9525">
+                  <a14:hiddenLine xmlns="" xmlns:a14="http://schemas.microsoft.com/office/drawing/2010/main" w="9525">
                     <a:solidFill>
                       <a:srgbClr val="000000"/>
                     </a:solidFill>
@@ -9595,7 +9595,7 @@
               </a:ln>
               <a:extLst>
                 <a:ext uri="{91240B29-F687-4f45-9708-019B960494DF}">
-                  <a14:hiddenLine xmlns:a14="http://schemas.microsoft.com/office/drawing/2010/main" xmlns="" w="9525">
+                  <a14:hiddenLine xmlns="" xmlns:a14="http://schemas.microsoft.com/office/drawing/2010/main" w="9525">
                     <a:solidFill>
                       <a:srgbClr val="000000"/>
                     </a:solidFill>
@@ -9685,7 +9685,7 @@
               </a:ln>
               <a:extLst>
                 <a:ext uri="{91240B29-F687-4f45-9708-019B960494DF}">
-                  <a14:hiddenLine xmlns:a14="http://schemas.microsoft.com/office/drawing/2010/main" xmlns="" w="9525">
+                  <a14:hiddenLine xmlns="" xmlns:a14="http://schemas.microsoft.com/office/drawing/2010/main" w="9525">
                     <a:solidFill>
                       <a:srgbClr val="000000"/>
                     </a:solidFill>
@@ -9747,7 +9747,7 @@
               </a:ln>
               <a:extLst>
                 <a:ext uri="{91240B29-F687-4f45-9708-019B960494DF}">
-                  <a14:hiddenLine xmlns:a14="http://schemas.microsoft.com/office/drawing/2010/main" xmlns="" w="9525">
+                  <a14:hiddenLine xmlns="" xmlns:a14="http://schemas.microsoft.com/office/drawing/2010/main" w="9525">
                     <a:solidFill>
                       <a:srgbClr val="000000"/>
                     </a:solidFill>
@@ -9857,7 +9857,7 @@
               </a:ln>
               <a:extLst>
                 <a:ext uri="{91240B29-F687-4f45-9708-019B960494DF}">
-                  <a14:hiddenLine xmlns:a14="http://schemas.microsoft.com/office/drawing/2010/main" xmlns="" w="9525">
+                  <a14:hiddenLine xmlns="" xmlns:a14="http://schemas.microsoft.com/office/drawing/2010/main" w="9525">
                     <a:solidFill>
                       <a:srgbClr val="000000"/>
                     </a:solidFill>
@@ -9941,7 +9941,7 @@
               </a:ln>
               <a:extLst>
                 <a:ext uri="{91240B29-F687-4f45-9708-019B960494DF}">
-                  <a14:hiddenLine xmlns:a14="http://schemas.microsoft.com/office/drawing/2010/main" xmlns="" w="9525">
+                  <a14:hiddenLine xmlns="" xmlns:a14="http://schemas.microsoft.com/office/drawing/2010/main" w="9525">
                     <a:solidFill>
                       <a:srgbClr val="000000"/>
                     </a:solidFill>
@@ -10003,7 +10003,7 @@
               </a:ln>
               <a:extLst>
                 <a:ext uri="{91240B29-F687-4f45-9708-019B960494DF}">
-                  <a14:hiddenLine xmlns:a14="http://schemas.microsoft.com/office/drawing/2010/main" xmlns="" w="9525">
+                  <a14:hiddenLine xmlns="" xmlns:a14="http://schemas.microsoft.com/office/drawing/2010/main" w="9525">
                     <a:solidFill>
                       <a:srgbClr val="000000"/>
                     </a:solidFill>
@@ -10065,7 +10065,7 @@
               </a:ln>
               <a:extLst>
                 <a:ext uri="{91240B29-F687-4f45-9708-019B960494DF}">
-                  <a14:hiddenLine xmlns:a14="http://schemas.microsoft.com/office/drawing/2010/main" xmlns="" w="9525">
+                  <a14:hiddenLine xmlns="" xmlns:a14="http://schemas.microsoft.com/office/drawing/2010/main" w="9525">
                     <a:solidFill>
                       <a:srgbClr val="000000"/>
                     </a:solidFill>
@@ -10155,7 +10155,7 @@
               </a:ln>
               <a:extLst>
                 <a:ext uri="{91240B29-F687-4f45-9708-019B960494DF}">
-                  <a14:hiddenLine xmlns:a14="http://schemas.microsoft.com/office/drawing/2010/main" xmlns="" w="9525">
+                  <a14:hiddenLine xmlns="" xmlns:a14="http://schemas.microsoft.com/office/drawing/2010/main" w="9525">
                     <a:solidFill>
                       <a:srgbClr val="000000"/>
                     </a:solidFill>
@@ -10189,7 +10189,7 @@
               </a:ln>
               <a:extLst>
                 <a:ext uri="{91240B29-F687-4f45-9708-019B960494DF}">
-                  <a14:hiddenLine xmlns:a14="http://schemas.microsoft.com/office/drawing/2010/main" xmlns="" w="9525">
+                  <a14:hiddenLine xmlns="" xmlns:a14="http://schemas.microsoft.com/office/drawing/2010/main" w="9525">
                     <a:solidFill>
                       <a:srgbClr val="000000"/>
                     </a:solidFill>
@@ -10254,7 +10254,7 @@
               </a:ln>
               <a:extLst>
                 <a:ext uri="{91240B29-F687-4f45-9708-019B960494DF}">
-                  <a14:hiddenLine xmlns:a14="http://schemas.microsoft.com/office/drawing/2010/main" xmlns="" w="9525">
+                  <a14:hiddenLine xmlns="" xmlns:a14="http://schemas.microsoft.com/office/drawing/2010/main" w="9525">
                     <a:solidFill>
                       <a:srgbClr val="000000"/>
                     </a:solidFill>
@@ -10344,7 +10344,7 @@
               </a:ln>
               <a:extLst>
                 <a:ext uri="{91240B29-F687-4f45-9708-019B960494DF}">
-                  <a14:hiddenLine xmlns:a14="http://schemas.microsoft.com/office/drawing/2010/main" xmlns="" w="9525">
+                  <a14:hiddenLine xmlns="" xmlns:a14="http://schemas.microsoft.com/office/drawing/2010/main" w="9525">
                     <a:solidFill>
                       <a:srgbClr val="000000"/>
                     </a:solidFill>
@@ -10406,7 +10406,7 @@
               </a:ln>
               <a:extLst>
                 <a:ext uri="{91240B29-F687-4f45-9708-019B960494DF}">
-                  <a14:hiddenLine xmlns:a14="http://schemas.microsoft.com/office/drawing/2010/main" xmlns="" w="9525">
+                  <a14:hiddenLine xmlns="" xmlns:a14="http://schemas.microsoft.com/office/drawing/2010/main" w="9525">
                     <a:solidFill>
                       <a:srgbClr val="000000"/>
                     </a:solidFill>
@@ -10496,7 +10496,7 @@
               </a:ln>
               <a:extLst>
                 <a:ext uri="{91240B29-F687-4f45-9708-019B960494DF}">
-                  <a14:hiddenLine xmlns:a14="http://schemas.microsoft.com/office/drawing/2010/main" xmlns="" w="9525">
+                  <a14:hiddenLine xmlns="" xmlns:a14="http://schemas.microsoft.com/office/drawing/2010/main" w="9525">
                     <a:solidFill>
                       <a:srgbClr val="000000"/>
                     </a:solidFill>
@@ -10561,7 +10561,7 @@
               </a:ln>
               <a:extLst>
                 <a:ext uri="{91240B29-F687-4f45-9708-019B960494DF}">
-                  <a14:hiddenLine xmlns:a14="http://schemas.microsoft.com/office/drawing/2010/main" xmlns="" w="9525">
+                  <a14:hiddenLine xmlns="" xmlns:a14="http://schemas.microsoft.com/office/drawing/2010/main" w="9525">
                     <a:solidFill>
                       <a:srgbClr val="000000"/>
                     </a:solidFill>
@@ -10623,7 +10623,7 @@
               </a:ln>
               <a:extLst>
                 <a:ext uri="{91240B29-F687-4f45-9708-019B960494DF}">
-                  <a14:hiddenLine xmlns:a14="http://schemas.microsoft.com/office/drawing/2010/main" xmlns="" w="9525">
+                  <a14:hiddenLine xmlns="" xmlns:a14="http://schemas.microsoft.com/office/drawing/2010/main" w="9525">
                     <a:solidFill>
                       <a:srgbClr val="000000"/>
                     </a:solidFill>
@@ -10713,7 +10713,7 @@
               </a:ln>
               <a:extLst>
                 <a:ext uri="{91240B29-F687-4f45-9708-019B960494DF}">
-                  <a14:hiddenLine xmlns:a14="http://schemas.microsoft.com/office/drawing/2010/main" xmlns="" w="9525">
+                  <a14:hiddenLine xmlns="" xmlns:a14="http://schemas.microsoft.com/office/drawing/2010/main" w="9525">
                     <a:solidFill>
                       <a:srgbClr val="000000"/>
                     </a:solidFill>
@@ -10803,7 +10803,7 @@
               </a:ln>
               <a:extLst>
                 <a:ext uri="{91240B29-F687-4f45-9708-019B960494DF}">
-                  <a14:hiddenLine xmlns:a14="http://schemas.microsoft.com/office/drawing/2010/main" xmlns="" w="9525">
+                  <a14:hiddenLine xmlns="" xmlns:a14="http://schemas.microsoft.com/office/drawing/2010/main" w="9525">
                     <a:solidFill>
                       <a:srgbClr val="000000"/>
                     </a:solidFill>
@@ -10868,7 +10868,7 @@
               </a:ln>
               <a:extLst>
                 <a:ext uri="{91240B29-F687-4f45-9708-019B960494DF}">
-                  <a14:hiddenLine xmlns:a14="http://schemas.microsoft.com/office/drawing/2010/main" xmlns="" w="9525">
+                  <a14:hiddenLine xmlns="" xmlns:a14="http://schemas.microsoft.com/office/drawing/2010/main" w="9525">
                     <a:solidFill>
                       <a:srgbClr val="000000"/>
                     </a:solidFill>
@@ -10988,7 +10988,7 @@
               </a:ln>
               <a:extLst>
                 <a:ext uri="{91240B29-F687-4f45-9708-019B960494DF}">
-                  <a14:hiddenLine xmlns:a14="http://schemas.microsoft.com/office/drawing/2010/main" xmlns="" w="9525">
+                  <a14:hiddenLine xmlns="" xmlns:a14="http://schemas.microsoft.com/office/drawing/2010/main" w="9525">
                     <a:solidFill>
                       <a:srgbClr val="000000"/>
                     </a:solidFill>
@@ -11086,7 +11086,7 @@
               </a:ln>
               <a:extLst>
                 <a:ext uri="{91240B29-F687-4f45-9708-019B960494DF}">
-                  <a14:hiddenLine xmlns:a14="http://schemas.microsoft.com/office/drawing/2010/main" xmlns="" w="9525">
+                  <a14:hiddenLine xmlns="" xmlns:a14="http://schemas.microsoft.com/office/drawing/2010/main" w="9525">
                     <a:solidFill>
                       <a:srgbClr val="000000"/>
                     </a:solidFill>
@@ -11201,7 +11201,7 @@
               </a:ln>
               <a:extLst>
                 <a:ext uri="{91240B29-F687-4f45-9708-019B960494DF}">
-                  <a14:hiddenLine xmlns:a14="http://schemas.microsoft.com/office/drawing/2010/main" xmlns="" w="9525">
+                  <a14:hiddenLine xmlns="" xmlns:a14="http://schemas.microsoft.com/office/drawing/2010/main" w="9525">
                     <a:solidFill>
                       <a:srgbClr val="000000"/>
                     </a:solidFill>
@@ -11291,7 +11291,7 @@
               </a:ln>
               <a:extLst>
                 <a:ext uri="{91240B29-F687-4f45-9708-019B960494DF}">
-                  <a14:hiddenLine xmlns:a14="http://schemas.microsoft.com/office/drawing/2010/main" xmlns="" w="9525">
+                  <a14:hiddenLine xmlns="" xmlns:a14="http://schemas.microsoft.com/office/drawing/2010/main" w="9525">
                     <a:solidFill>
                       <a:srgbClr val="000000"/>
                     </a:solidFill>
@@ -11356,7 +11356,7 @@
               </a:ln>
               <a:extLst>
                 <a:ext uri="{91240B29-F687-4f45-9708-019B960494DF}">
-                  <a14:hiddenLine xmlns:a14="http://schemas.microsoft.com/office/drawing/2010/main" xmlns="" w="9525">
+                  <a14:hiddenLine xmlns="" xmlns:a14="http://schemas.microsoft.com/office/drawing/2010/main" w="9525">
                     <a:solidFill>
                       <a:srgbClr val="000000"/>
                     </a:solidFill>
@@ -11446,7 +11446,7 @@
               </a:ln>
               <a:extLst>
                 <a:ext uri="{91240B29-F687-4f45-9708-019B960494DF}">
-                  <a14:hiddenLine xmlns:a14="http://schemas.microsoft.com/office/drawing/2010/main" xmlns="" w="9525">
+                  <a14:hiddenLine xmlns="" xmlns:a14="http://schemas.microsoft.com/office/drawing/2010/main" w="9525">
                     <a:solidFill>
                       <a:srgbClr val="000000"/>
                     </a:solidFill>
@@ -11514,7 +11514,7 @@
               </a:ln>
               <a:extLst>
                 <a:ext uri="{91240B29-F687-4f45-9708-019B960494DF}">
-                  <a14:hiddenLine xmlns:a14="http://schemas.microsoft.com/office/drawing/2010/main" xmlns="" w="9525">
+                  <a14:hiddenLine xmlns="" xmlns:a14="http://schemas.microsoft.com/office/drawing/2010/main" w="9525">
                     <a:solidFill>
                       <a:srgbClr val="000000"/>
                     </a:solidFill>
@@ -11604,7 +11604,7 @@
               </a:ln>
               <a:extLst>
                 <a:ext uri="{91240B29-F687-4f45-9708-019B960494DF}">
-                  <a14:hiddenLine xmlns:a14="http://schemas.microsoft.com/office/drawing/2010/main" xmlns="" w="9525">
+                  <a14:hiddenLine xmlns="" xmlns:a14="http://schemas.microsoft.com/office/drawing/2010/main" w="9525">
                     <a:solidFill>
                       <a:srgbClr val="000000"/>
                     </a:solidFill>
@@ -11672,7 +11672,7 @@
               </a:ln>
               <a:extLst>
                 <a:ext uri="{91240B29-F687-4f45-9708-019B960494DF}">
-                  <a14:hiddenLine xmlns:a14="http://schemas.microsoft.com/office/drawing/2010/main" xmlns="" w="9525">
+                  <a14:hiddenLine xmlns="" xmlns:a14="http://schemas.microsoft.com/office/drawing/2010/main" w="9525">
                     <a:solidFill>
                       <a:srgbClr val="000000"/>
                     </a:solidFill>
@@ -11762,7 +11762,7 @@
               </a:ln>
               <a:extLst>
                 <a:ext uri="{91240B29-F687-4f45-9708-019B960494DF}">
-                  <a14:hiddenLine xmlns:a14="http://schemas.microsoft.com/office/drawing/2010/main" xmlns="" w="9525">
+                  <a14:hiddenLine xmlns="" xmlns:a14="http://schemas.microsoft.com/office/drawing/2010/main" w="9525">
                     <a:solidFill>
                       <a:srgbClr val="000000"/>
                     </a:solidFill>
@@ -11796,7 +11796,7 @@
               </a:ln>
               <a:extLst>
                 <a:ext uri="{91240B29-F687-4f45-9708-019B960494DF}">
-                  <a14:hiddenLine xmlns:a14="http://schemas.microsoft.com/office/drawing/2010/main" xmlns="" w="9525">
+                  <a14:hiddenLine xmlns="" xmlns:a14="http://schemas.microsoft.com/office/drawing/2010/main" w="9525">
                     <a:solidFill>
                       <a:srgbClr val="000000"/>
                     </a:solidFill>
@@ -11937,7 +11937,7 @@
             <a:fld id="{48A87A34-81AB-432B-8DAE-1953F412C126}" type="datetimeFigureOut">
               <a:rPr lang="en-US" dirty="0"/>
               <a:pPr/>
-              <a:t>11/2/2022</a:t>
+              <a:t>11/10/2022</a:t>
             </a:fld>
             <a:endParaRPr lang="en-US" dirty="0"/>
           </a:p>
@@ -12885,6 +12885,19 @@
             <a:endParaRPr lang="en-US" dirty="0"/>
           </a:p>
           <a:p>
+            <a:r>
+              <a:rPr lang="en-US">
+                <a:hlinkClick r:id="rId3"/>
+              </a:rPr>
+              <a:t>https://www.hackerrank.com/sda-hw-3</a:t>
+            </a:r>
+            <a:r>
+              <a:rPr lang="en-US"/>
+              <a:t> </a:t>
+            </a:r>
+            <a:endParaRPr lang="en-US" dirty="0"/>
+          </a:p>
+          <a:p>
             <a:endParaRPr lang="bg-BG" dirty="0"/>
           </a:p>
         </p:txBody>

</xml_diff>